<commit_message>
G2-1774 Update apache POI
</commit_message>
<xml_diff>
--- a/en-presentation/src/test/java/com/g2forge/enigma/presentation/code.pptx
+++ b/en-presentation/src/test/java/com/g2forge/enigma/presentation/code.pptx
@@ -1,6 +1,6 @@
 
 <file path=ppt/presentation.xml><?xml version="1.0" encoding="utf-8"?>
-<p:presentation xmlns:a="http://schemas.openxmlformats.org/drawingml/2006/main" xmlns:p="http://schemas.openxmlformats.org/presentationml/2006/main" xmlns:r="http://schemas.openxmlformats.org/officeDocument/2006/relationships" saveSubsetFonts="1">
+<p:presentation xmlns:a="http://schemas.openxmlformats.org/drawingml/2006/main" xmlns:r="http://schemas.openxmlformats.org/officeDocument/2006/relationships" xmlns:p="http://schemas.openxmlformats.org/presentationml/2006/main" saveSubsetFonts="1">
   <p:sldMasterIdLst>
     <p:sldMasterId id="2147483648" r:id="rId1"/>
   </p:sldMasterIdLst>
@@ -13,8 +13,8 @@
     <a:defPPr>
       <a:defRPr lang="en-US"/>
     </a:defPPr>
-    <a:lvl1pPr algn="l" defTabSz="914400" eaLnBrk="1" hangingPunct="1" latinLnBrk="0" marL="0" rtl="0">
-      <a:defRPr kern="1200" sz="1800">
+    <a:lvl1pPr marL="0" algn="l" defTabSz="914400" rtl="0" eaLnBrk="1" latinLnBrk="0" hangingPunct="1">
+      <a:defRPr sz="1800" kern="1200">
         <a:solidFill>
           <a:schemeClr val="tx1"/>
         </a:solidFill>
@@ -23,8 +23,8 @@
         <a:cs typeface="+mn-cs"/>
       </a:defRPr>
     </a:lvl1pPr>
-    <a:lvl2pPr algn="l" defTabSz="914400" eaLnBrk="1" hangingPunct="1" latinLnBrk="0" marL="457200" rtl="0">
-      <a:defRPr kern="1200" sz="1800">
+    <a:lvl2pPr marL="457200" algn="l" defTabSz="914400" rtl="0" eaLnBrk="1" latinLnBrk="0" hangingPunct="1">
+      <a:defRPr sz="1800" kern="1200">
         <a:solidFill>
           <a:schemeClr val="tx1"/>
         </a:solidFill>
@@ -33,8 +33,8 @@
         <a:cs typeface="+mn-cs"/>
       </a:defRPr>
     </a:lvl2pPr>
-    <a:lvl3pPr algn="l" defTabSz="914400" eaLnBrk="1" hangingPunct="1" latinLnBrk="0" marL="914400" rtl="0">
-      <a:defRPr kern="1200" sz="1800">
+    <a:lvl3pPr marL="914400" algn="l" defTabSz="914400" rtl="0" eaLnBrk="1" latinLnBrk="0" hangingPunct="1">
+      <a:defRPr sz="1800" kern="1200">
         <a:solidFill>
           <a:schemeClr val="tx1"/>
         </a:solidFill>
@@ -43,8 +43,8 @@
         <a:cs typeface="+mn-cs"/>
       </a:defRPr>
     </a:lvl3pPr>
-    <a:lvl4pPr algn="l" defTabSz="914400" eaLnBrk="1" hangingPunct="1" latinLnBrk="0" marL="1371600" rtl="0">
-      <a:defRPr kern="1200" sz="1800">
+    <a:lvl4pPr marL="1371600" algn="l" defTabSz="914400" rtl="0" eaLnBrk="1" latinLnBrk="0" hangingPunct="1">
+      <a:defRPr sz="1800" kern="1200">
         <a:solidFill>
           <a:schemeClr val="tx1"/>
         </a:solidFill>
@@ -53,8 +53,8 @@
         <a:cs typeface="+mn-cs"/>
       </a:defRPr>
     </a:lvl4pPr>
-    <a:lvl5pPr algn="l" defTabSz="914400" eaLnBrk="1" hangingPunct="1" latinLnBrk="0" marL="1828800" rtl="0">
-      <a:defRPr kern="1200" sz="1800">
+    <a:lvl5pPr marL="1828800" algn="l" defTabSz="914400" rtl="0" eaLnBrk="1" latinLnBrk="0" hangingPunct="1">
+      <a:defRPr sz="1800" kern="1200">
         <a:solidFill>
           <a:schemeClr val="tx1"/>
         </a:solidFill>
@@ -63,8 +63,8 @@
         <a:cs typeface="+mn-cs"/>
       </a:defRPr>
     </a:lvl5pPr>
-    <a:lvl6pPr algn="l" defTabSz="914400" eaLnBrk="1" hangingPunct="1" latinLnBrk="0" marL="2286000" rtl="0">
-      <a:defRPr kern="1200" sz="1800">
+    <a:lvl6pPr marL="2286000" algn="l" defTabSz="914400" rtl="0" eaLnBrk="1" latinLnBrk="0" hangingPunct="1">
+      <a:defRPr sz="1800" kern="1200">
         <a:solidFill>
           <a:schemeClr val="tx1"/>
         </a:solidFill>
@@ -73,8 +73,8 @@
         <a:cs typeface="+mn-cs"/>
       </a:defRPr>
     </a:lvl6pPr>
-    <a:lvl7pPr algn="l" defTabSz="914400" eaLnBrk="1" hangingPunct="1" latinLnBrk="0" marL="2743200" rtl="0">
-      <a:defRPr kern="1200" sz="1800">
+    <a:lvl7pPr marL="2743200" algn="l" defTabSz="914400" rtl="0" eaLnBrk="1" latinLnBrk="0" hangingPunct="1">
+      <a:defRPr sz="1800" kern="1200">
         <a:solidFill>
           <a:schemeClr val="tx1"/>
         </a:solidFill>
@@ -83,8 +83,8 @@
         <a:cs typeface="+mn-cs"/>
       </a:defRPr>
     </a:lvl7pPr>
-    <a:lvl8pPr algn="l" defTabSz="914400" eaLnBrk="1" hangingPunct="1" latinLnBrk="0" marL="3200400" rtl="0">
-      <a:defRPr kern="1200" sz="1800">
+    <a:lvl8pPr marL="3200400" algn="l" defTabSz="914400" rtl="0" eaLnBrk="1" latinLnBrk="0" hangingPunct="1">
+      <a:defRPr sz="1800" kern="1200">
         <a:solidFill>
           <a:schemeClr val="tx1"/>
         </a:solidFill>
@@ -93,8 +93,8 @@
         <a:cs typeface="+mn-cs"/>
       </a:defRPr>
     </a:lvl8pPr>
-    <a:lvl9pPr algn="l" defTabSz="914400" eaLnBrk="1" hangingPunct="1" latinLnBrk="0" marL="3657600" rtl="0">
-      <a:defRPr kern="1200" sz="1800">
+    <a:lvl9pPr marL="3657600" algn="l" defTabSz="914400" rtl="0" eaLnBrk="1" latinLnBrk="0" hangingPunct="1">
+      <a:defRPr sz="1800" kern="1200">
         <a:solidFill>
           <a:schemeClr val="tx1"/>
         </a:solidFill>
@@ -108,7 +108,7 @@
 </file>
 
 <file path=ppt/slideLayouts/slideLayout1.xml><?xml version="1.0" encoding="utf-8"?>
-<p:sldLayout xmlns:a="http://schemas.openxmlformats.org/drawingml/2006/main" xmlns:p="http://schemas.openxmlformats.org/presentationml/2006/main" xmlns:r="http://schemas.openxmlformats.org/officeDocument/2006/relationships" preserve="1" type="title">
+<p:sldLayout xmlns:a="http://schemas.openxmlformats.org/drawingml/2006/main" xmlns:r="http://schemas.openxmlformats.org/officeDocument/2006/relationships" xmlns:p="http://schemas.openxmlformats.org/presentationml/2006/main" type="title" preserve="1">
   <p:cSld name="Title Slide">
     <p:spTree>
       <p:nvGrpSpPr>
@@ -159,7 +159,7 @@
             <a:spLocks noGrp="1"/>
           </p:cNvSpPr>
           <p:nvPr>
-            <p:ph idx="1" type="subTitle"/>
+            <p:ph type="subTitle" idx="1"/>
           </p:nvPr>
         </p:nvSpPr>
         <p:spPr>
@@ -171,7 +171,7 @@
         <p:txBody>
           <a:bodyPr/>
           <a:lstStyle>
-            <a:lvl1pPr algn="ctr" indent="0" marL="0">
+            <a:lvl1pPr marL="0" indent="0" algn="ctr">
               <a:buNone/>
               <a:defRPr>
                 <a:solidFill>
@@ -181,7 +181,7 @@
                 </a:solidFill>
               </a:defRPr>
             </a:lvl1pPr>
-            <a:lvl2pPr algn="ctr" indent="0" marL="457200">
+            <a:lvl2pPr marL="457200" indent="0" algn="ctr">
               <a:buNone/>
               <a:defRPr>
                 <a:solidFill>
@@ -191,7 +191,7 @@
                 </a:solidFill>
               </a:defRPr>
             </a:lvl2pPr>
-            <a:lvl3pPr algn="ctr" indent="0" marL="914400">
+            <a:lvl3pPr marL="914400" indent="0" algn="ctr">
               <a:buNone/>
               <a:defRPr>
                 <a:solidFill>
@@ -201,7 +201,7 @@
                 </a:solidFill>
               </a:defRPr>
             </a:lvl3pPr>
-            <a:lvl4pPr algn="ctr" indent="0" marL="1371600">
+            <a:lvl4pPr marL="1371600" indent="0" algn="ctr">
               <a:buNone/>
               <a:defRPr>
                 <a:solidFill>
@@ -211,7 +211,7 @@
                 </a:solidFill>
               </a:defRPr>
             </a:lvl4pPr>
-            <a:lvl5pPr algn="ctr" indent="0" marL="1828800">
+            <a:lvl5pPr marL="1828800" indent="0" algn="ctr">
               <a:buNone/>
               <a:defRPr>
                 <a:solidFill>
@@ -221,7 +221,7 @@
                 </a:solidFill>
               </a:defRPr>
             </a:lvl5pPr>
-            <a:lvl6pPr algn="ctr" indent="0" marL="2286000">
+            <a:lvl6pPr marL="2286000" indent="0" algn="ctr">
               <a:buNone/>
               <a:defRPr>
                 <a:solidFill>
@@ -231,7 +231,7 @@
                 </a:solidFill>
               </a:defRPr>
             </a:lvl6pPr>
-            <a:lvl7pPr algn="ctr" indent="0" marL="2743200">
+            <a:lvl7pPr marL="2743200" indent="0" algn="ctr">
               <a:buNone/>
               <a:defRPr>
                 <a:solidFill>
@@ -241,7 +241,7 @@
                 </a:solidFill>
               </a:defRPr>
             </a:lvl7pPr>
-            <a:lvl8pPr algn="ctr" indent="0" marL="3200400">
+            <a:lvl8pPr marL="3200400" indent="0" algn="ctr">
               <a:buNone/>
               <a:defRPr>
                 <a:solidFill>
@@ -251,7 +251,7 @@
                 </a:solidFill>
               </a:defRPr>
             </a:lvl8pPr>
-            <a:lvl9pPr algn="ctr" indent="0" marL="3657600">
+            <a:lvl9pPr marL="3657600" indent="0" algn="ctr">
               <a:buNone/>
               <a:defRPr>
                 <a:solidFill>
@@ -278,7 +278,7 @@
             <a:spLocks noGrp="1"/>
           </p:cNvSpPr>
           <p:nvPr>
-            <p:ph idx="10" sz="half" type="dt"/>
+            <p:ph type="dt" sz="half" idx="10"/>
           </p:nvPr>
         </p:nvSpPr>
         <p:spPr/>
@@ -302,7 +302,7 @@
             <a:spLocks noGrp="1"/>
           </p:cNvSpPr>
           <p:nvPr>
-            <p:ph idx="11" sz="quarter" type="ftr"/>
+            <p:ph type="ftr" sz="quarter" idx="11"/>
           </p:nvPr>
         </p:nvSpPr>
         <p:spPr/>
@@ -321,7 +321,7 @@
             <a:spLocks noGrp="1"/>
           </p:cNvSpPr>
           <p:nvPr>
-            <p:ph idx="12" sz="quarter" type="sldNum"/>
+            <p:ph type="sldNum" sz="quarter" idx="12"/>
           </p:nvPr>
         </p:nvSpPr>
         <p:spPr/>
@@ -347,7 +347,7 @@
 </file>
 
 <file path=ppt/slideLayouts/slideLayout10.xml><?xml version="1.0" encoding="utf-8"?>
-<p:sldLayout xmlns:a="http://schemas.openxmlformats.org/drawingml/2006/main" xmlns:p="http://schemas.openxmlformats.org/presentationml/2006/main" xmlns:r="http://schemas.openxmlformats.org/officeDocument/2006/relationships" preserve="1" type="vertTx">
+<p:sldLayout xmlns:a="http://schemas.openxmlformats.org/drawingml/2006/main" xmlns:r="http://schemas.openxmlformats.org/officeDocument/2006/relationships" xmlns:p="http://schemas.openxmlformats.org/presentationml/2006/main" type="vertTx" preserve="1">
   <p:cSld name="Title and Vertical Text">
     <p:spTree>
       <p:nvGrpSpPr>
@@ -393,7 +393,7 @@
             <a:spLocks noGrp="1"/>
           </p:cNvSpPr>
           <p:nvPr>
-            <p:ph idx="1" orient="vert" type="body"/>
+            <p:ph type="body" orient="vert" idx="1"/>
           </p:nvPr>
         </p:nvSpPr>
         <p:spPr/>
@@ -445,7 +445,7 @@
             <a:spLocks noGrp="1"/>
           </p:cNvSpPr>
           <p:nvPr>
-            <p:ph idx="10" sz="half" type="dt"/>
+            <p:ph type="dt" sz="half" idx="10"/>
           </p:nvPr>
         </p:nvSpPr>
         <p:spPr/>
@@ -469,7 +469,7 @@
             <a:spLocks noGrp="1"/>
           </p:cNvSpPr>
           <p:nvPr>
-            <p:ph idx="11" sz="quarter" type="ftr"/>
+            <p:ph type="ftr" sz="quarter" idx="11"/>
           </p:nvPr>
         </p:nvSpPr>
         <p:spPr/>
@@ -488,7 +488,7 @@
             <a:spLocks noGrp="1"/>
           </p:cNvSpPr>
           <p:nvPr>
-            <p:ph idx="12" sz="quarter" type="sldNum"/>
+            <p:ph type="sldNum" sz="quarter" idx="12"/>
           </p:nvPr>
         </p:nvSpPr>
         <p:spPr/>
@@ -514,7 +514,7 @@
 </file>
 
 <file path=ppt/slideLayouts/slideLayout11.xml><?xml version="1.0" encoding="utf-8"?>
-<p:sldLayout xmlns:a="http://schemas.openxmlformats.org/drawingml/2006/main" xmlns:p="http://schemas.openxmlformats.org/presentationml/2006/main" xmlns:r="http://schemas.openxmlformats.org/officeDocument/2006/relationships" preserve="1" type="vertTitleAndTx">
+<p:sldLayout xmlns:a="http://schemas.openxmlformats.org/drawingml/2006/main" xmlns:r="http://schemas.openxmlformats.org/officeDocument/2006/relationships" xmlns:p="http://schemas.openxmlformats.org/presentationml/2006/main" type="vertTitleAndTx" preserve="1">
   <p:cSld name="Vertical Title and Text">
     <p:spTree>
       <p:nvGrpSpPr>
@@ -537,7 +537,7 @@
             <a:spLocks noGrp="1"/>
           </p:cNvSpPr>
           <p:nvPr>
-            <p:ph orient="vert" type="title"/>
+            <p:ph type="title" orient="vert"/>
           </p:nvPr>
         </p:nvSpPr>
         <p:spPr>
@@ -565,7 +565,7 @@
             <a:spLocks noGrp="1"/>
           </p:cNvSpPr>
           <p:nvPr>
-            <p:ph idx="1" orient="vert" type="body"/>
+            <p:ph type="body" orient="vert" idx="1"/>
           </p:nvPr>
         </p:nvSpPr>
         <p:spPr>
@@ -622,7 +622,7 @@
             <a:spLocks noGrp="1"/>
           </p:cNvSpPr>
           <p:nvPr>
-            <p:ph idx="10" sz="half" type="dt"/>
+            <p:ph type="dt" sz="half" idx="10"/>
           </p:nvPr>
         </p:nvSpPr>
         <p:spPr/>
@@ -646,7 +646,7 @@
             <a:spLocks noGrp="1"/>
           </p:cNvSpPr>
           <p:nvPr>
-            <p:ph idx="11" sz="quarter" type="ftr"/>
+            <p:ph type="ftr" sz="quarter" idx="11"/>
           </p:nvPr>
         </p:nvSpPr>
         <p:spPr/>
@@ -665,7 +665,7 @@
             <a:spLocks noGrp="1"/>
           </p:cNvSpPr>
           <p:nvPr>
-            <p:ph idx="12" sz="quarter" type="sldNum"/>
+            <p:ph type="sldNum" sz="quarter" idx="12"/>
           </p:nvPr>
         </p:nvSpPr>
         <p:spPr/>
@@ -691,7 +691,7 @@
 </file>
 
 <file path=ppt/slideLayouts/slideLayout2.xml><?xml version="1.0" encoding="utf-8"?>
-<p:sldLayout xmlns:a="http://schemas.openxmlformats.org/drawingml/2006/main" xmlns:p="http://schemas.openxmlformats.org/presentationml/2006/main" xmlns:r="http://schemas.openxmlformats.org/officeDocument/2006/relationships" preserve="1" type="obj">
+<p:sldLayout xmlns:a="http://schemas.openxmlformats.org/drawingml/2006/main" xmlns:r="http://schemas.openxmlformats.org/officeDocument/2006/relationships" xmlns:p="http://schemas.openxmlformats.org/presentationml/2006/main" type="obj" preserve="1">
   <p:cSld name="Title and Content">
     <p:spTree>
       <p:nvGrpSpPr>
@@ -789,7 +789,7 @@
             <a:spLocks noGrp="1"/>
           </p:cNvSpPr>
           <p:nvPr>
-            <p:ph idx="10" sz="half" type="dt"/>
+            <p:ph type="dt" sz="half" idx="10"/>
           </p:nvPr>
         </p:nvSpPr>
         <p:spPr/>
@@ -813,7 +813,7 @@
             <a:spLocks noGrp="1"/>
           </p:cNvSpPr>
           <p:nvPr>
-            <p:ph idx="11" sz="quarter" type="ftr"/>
+            <p:ph type="ftr" sz="quarter" idx="11"/>
           </p:nvPr>
         </p:nvSpPr>
         <p:spPr/>
@@ -832,7 +832,7 @@
             <a:spLocks noGrp="1"/>
           </p:cNvSpPr>
           <p:nvPr>
-            <p:ph idx="12" sz="quarter" type="sldNum"/>
+            <p:ph type="sldNum" sz="quarter" idx="12"/>
           </p:nvPr>
         </p:nvSpPr>
         <p:spPr/>
@@ -858,7 +858,7 @@
 </file>
 
 <file path=ppt/slideLayouts/slideLayout3.xml><?xml version="1.0" encoding="utf-8"?>
-<p:sldLayout xmlns:a="http://schemas.openxmlformats.org/drawingml/2006/main" xmlns:p="http://schemas.openxmlformats.org/presentationml/2006/main" xmlns:r="http://schemas.openxmlformats.org/officeDocument/2006/relationships" preserve="1" type="secHead">
+<p:sldLayout xmlns:a="http://schemas.openxmlformats.org/drawingml/2006/main" xmlns:r="http://schemas.openxmlformats.org/officeDocument/2006/relationships" xmlns:p="http://schemas.openxmlformats.org/presentationml/2006/main" type="secHead" preserve="1">
   <p:cSld name="Section Header">
     <p:spTree>
       <p:nvGrpSpPr>
@@ -894,7 +894,7 @@
           <a:bodyPr anchor="t"/>
           <a:lstStyle>
             <a:lvl1pPr algn="l">
-              <a:defRPr b="1" cap="all" sz="4000"/>
+              <a:defRPr sz="4000" b="1" cap="all"/>
             </a:lvl1pPr>
           </a:lstStyle>
           <a:p>
@@ -913,7 +913,7 @@
             <a:spLocks noGrp="1"/>
           </p:cNvSpPr>
           <p:nvPr>
-            <p:ph idx="1" type="body"/>
+            <p:ph type="body" idx="1"/>
           </p:nvPr>
         </p:nvSpPr>
         <p:spPr>
@@ -925,7 +925,7 @@
         <p:txBody>
           <a:bodyPr anchor="b"/>
           <a:lstStyle>
-            <a:lvl1pPr indent="0" marL="0">
+            <a:lvl1pPr marL="0" indent="0">
               <a:buNone/>
               <a:defRPr sz="2000">
                 <a:solidFill>
@@ -935,7 +935,7 @@
                 </a:solidFill>
               </a:defRPr>
             </a:lvl1pPr>
-            <a:lvl2pPr indent="0" marL="457200">
+            <a:lvl2pPr marL="457200" indent="0">
               <a:buNone/>
               <a:defRPr sz="1800">
                 <a:solidFill>
@@ -945,7 +945,7 @@
                 </a:solidFill>
               </a:defRPr>
             </a:lvl2pPr>
-            <a:lvl3pPr indent="0" marL="914400">
+            <a:lvl3pPr marL="914400" indent="0">
               <a:buNone/>
               <a:defRPr sz="1600">
                 <a:solidFill>
@@ -955,7 +955,7 @@
                 </a:solidFill>
               </a:defRPr>
             </a:lvl3pPr>
-            <a:lvl4pPr indent="0" marL="1371600">
+            <a:lvl4pPr marL="1371600" indent="0">
               <a:buNone/>
               <a:defRPr sz="1400">
                 <a:solidFill>
@@ -965,7 +965,7 @@
                 </a:solidFill>
               </a:defRPr>
             </a:lvl4pPr>
-            <a:lvl5pPr indent="0" marL="1828800">
+            <a:lvl5pPr marL="1828800" indent="0">
               <a:buNone/>
               <a:defRPr sz="1400">
                 <a:solidFill>
@@ -975,7 +975,7 @@
                 </a:solidFill>
               </a:defRPr>
             </a:lvl5pPr>
-            <a:lvl6pPr indent="0" marL="2286000">
+            <a:lvl6pPr marL="2286000" indent="0">
               <a:buNone/>
               <a:defRPr sz="1400">
                 <a:solidFill>
@@ -985,7 +985,7 @@
                 </a:solidFill>
               </a:defRPr>
             </a:lvl6pPr>
-            <a:lvl7pPr indent="0" marL="2743200">
+            <a:lvl7pPr marL="2743200" indent="0">
               <a:buNone/>
               <a:defRPr sz="1400">
                 <a:solidFill>
@@ -995,7 +995,7 @@
                 </a:solidFill>
               </a:defRPr>
             </a:lvl7pPr>
-            <a:lvl8pPr indent="0" marL="3200400">
+            <a:lvl8pPr marL="3200400" indent="0">
               <a:buNone/>
               <a:defRPr sz="1400">
                 <a:solidFill>
@@ -1005,7 +1005,7 @@
                 </a:solidFill>
               </a:defRPr>
             </a:lvl8pPr>
-            <a:lvl9pPr indent="0" marL="3657600">
+            <a:lvl9pPr marL="3657600" indent="0">
               <a:buNone/>
               <a:defRPr sz="1400">
                 <a:solidFill>
@@ -1032,7 +1032,7 @@
             <a:spLocks noGrp="1"/>
           </p:cNvSpPr>
           <p:nvPr>
-            <p:ph idx="10" sz="half" type="dt"/>
+            <p:ph type="dt" sz="half" idx="10"/>
           </p:nvPr>
         </p:nvSpPr>
         <p:spPr/>
@@ -1056,7 +1056,7 @@
             <a:spLocks noGrp="1"/>
           </p:cNvSpPr>
           <p:nvPr>
-            <p:ph idx="11" sz="quarter" type="ftr"/>
+            <p:ph type="ftr" sz="quarter" idx="11"/>
           </p:nvPr>
         </p:nvSpPr>
         <p:spPr/>
@@ -1075,7 +1075,7 @@
             <a:spLocks noGrp="1"/>
           </p:cNvSpPr>
           <p:nvPr>
-            <p:ph idx="12" sz="quarter" type="sldNum"/>
+            <p:ph type="sldNum" sz="quarter" idx="12"/>
           </p:nvPr>
         </p:nvSpPr>
         <p:spPr/>
@@ -1101,7 +1101,7 @@
 </file>
 
 <file path=ppt/slideLayouts/slideLayout4.xml><?xml version="1.0" encoding="utf-8"?>
-<p:sldLayout xmlns:a="http://schemas.openxmlformats.org/drawingml/2006/main" xmlns:p="http://schemas.openxmlformats.org/presentationml/2006/main" xmlns:r="http://schemas.openxmlformats.org/officeDocument/2006/relationships" preserve="1" type="twoObj">
+<p:sldLayout xmlns:a="http://schemas.openxmlformats.org/drawingml/2006/main" xmlns:r="http://schemas.openxmlformats.org/officeDocument/2006/relationships" xmlns:p="http://schemas.openxmlformats.org/presentationml/2006/main" type="twoObj" preserve="1">
   <p:cSld name="Two Content">
     <p:spTree>
       <p:nvGrpSpPr>
@@ -1147,7 +1147,7 @@
             <a:spLocks noGrp="1"/>
           </p:cNvSpPr>
           <p:nvPr>
-            <p:ph idx="1" sz="half"/>
+            <p:ph sz="half" idx="1"/>
           </p:nvPr>
         </p:nvSpPr>
         <p:spPr>
@@ -1232,7 +1232,7 @@
             <a:spLocks noGrp="1"/>
           </p:cNvSpPr>
           <p:nvPr>
-            <p:ph idx="2" sz="half"/>
+            <p:ph sz="half" idx="2"/>
           </p:nvPr>
         </p:nvSpPr>
         <p:spPr>
@@ -1317,7 +1317,7 @@
             <a:spLocks noGrp="1"/>
           </p:cNvSpPr>
           <p:nvPr>
-            <p:ph idx="10" sz="half" type="dt"/>
+            <p:ph type="dt" sz="half" idx="10"/>
           </p:nvPr>
         </p:nvSpPr>
         <p:spPr/>
@@ -1341,7 +1341,7 @@
             <a:spLocks noGrp="1"/>
           </p:cNvSpPr>
           <p:nvPr>
-            <p:ph idx="11" sz="quarter" type="ftr"/>
+            <p:ph type="ftr" sz="quarter" idx="11"/>
           </p:nvPr>
         </p:nvSpPr>
         <p:spPr/>
@@ -1360,7 +1360,7 @@
             <a:spLocks noGrp="1"/>
           </p:cNvSpPr>
           <p:nvPr>
-            <p:ph idx="12" sz="quarter" type="sldNum"/>
+            <p:ph type="sldNum" sz="quarter" idx="12"/>
           </p:nvPr>
         </p:nvSpPr>
         <p:spPr/>
@@ -1386,7 +1386,7 @@
 </file>
 
 <file path=ppt/slideLayouts/slideLayout5.xml><?xml version="1.0" encoding="utf-8"?>
-<p:sldLayout xmlns:a="http://schemas.openxmlformats.org/drawingml/2006/main" xmlns:p="http://schemas.openxmlformats.org/presentationml/2006/main" xmlns:r="http://schemas.openxmlformats.org/officeDocument/2006/relationships" preserve="1" type="twoTxTwoObj">
+<p:sldLayout xmlns:a="http://schemas.openxmlformats.org/drawingml/2006/main" xmlns:r="http://schemas.openxmlformats.org/officeDocument/2006/relationships" xmlns:p="http://schemas.openxmlformats.org/presentationml/2006/main" type="twoTxTwoObj" preserve="1">
   <p:cSld name="Comparison">
     <p:spTree>
       <p:nvGrpSpPr>
@@ -1436,7 +1436,7 @@
             <a:spLocks noGrp="1"/>
           </p:cNvSpPr>
           <p:nvPr>
-            <p:ph idx="1" type="body"/>
+            <p:ph type="body" idx="1"/>
           </p:nvPr>
         </p:nvSpPr>
         <p:spPr>
@@ -1448,41 +1448,41 @@
         <p:txBody>
           <a:bodyPr anchor="b"/>
           <a:lstStyle>
-            <a:lvl1pPr indent="0" marL="0">
-              <a:buNone/>
-              <a:defRPr b="1" sz="2400"/>
+            <a:lvl1pPr marL="0" indent="0">
+              <a:buNone/>
+              <a:defRPr sz="2400" b="1"/>
             </a:lvl1pPr>
-            <a:lvl2pPr indent="0" marL="457200">
-              <a:buNone/>
-              <a:defRPr b="1" sz="2000"/>
+            <a:lvl2pPr marL="457200" indent="0">
+              <a:buNone/>
+              <a:defRPr sz="2000" b="1"/>
             </a:lvl2pPr>
-            <a:lvl3pPr indent="0" marL="914400">
-              <a:buNone/>
-              <a:defRPr b="1" sz="1800"/>
+            <a:lvl3pPr marL="914400" indent="0">
+              <a:buNone/>
+              <a:defRPr sz="1800" b="1"/>
             </a:lvl3pPr>
-            <a:lvl4pPr indent="0" marL="1371600">
-              <a:buNone/>
-              <a:defRPr b="1" sz="1600"/>
+            <a:lvl4pPr marL="1371600" indent="0">
+              <a:buNone/>
+              <a:defRPr sz="1600" b="1"/>
             </a:lvl4pPr>
-            <a:lvl5pPr indent="0" marL="1828800">
-              <a:buNone/>
-              <a:defRPr b="1" sz="1600"/>
+            <a:lvl5pPr marL="1828800" indent="0">
+              <a:buNone/>
+              <a:defRPr sz="1600" b="1"/>
             </a:lvl5pPr>
-            <a:lvl6pPr indent="0" marL="2286000">
-              <a:buNone/>
-              <a:defRPr b="1" sz="1600"/>
+            <a:lvl6pPr marL="2286000" indent="0">
+              <a:buNone/>
+              <a:defRPr sz="1600" b="1"/>
             </a:lvl6pPr>
-            <a:lvl7pPr indent="0" marL="2743200">
-              <a:buNone/>
-              <a:defRPr b="1" sz="1600"/>
+            <a:lvl7pPr marL="2743200" indent="0">
+              <a:buNone/>
+              <a:defRPr sz="1600" b="1"/>
             </a:lvl7pPr>
-            <a:lvl8pPr indent="0" marL="3200400">
-              <a:buNone/>
-              <a:defRPr b="1" sz="1600"/>
+            <a:lvl8pPr marL="3200400" indent="0">
+              <a:buNone/>
+              <a:defRPr sz="1600" b="1"/>
             </a:lvl8pPr>
-            <a:lvl9pPr indent="0" marL="3657600">
-              <a:buNone/>
-              <a:defRPr b="1" sz="1600"/>
+            <a:lvl9pPr marL="3657600" indent="0">
+              <a:buNone/>
+              <a:defRPr sz="1600" b="1"/>
             </a:lvl9pPr>
           </a:lstStyle>
           <a:p>
@@ -1501,7 +1501,7 @@
             <a:spLocks noGrp="1"/>
           </p:cNvSpPr>
           <p:nvPr>
-            <p:ph idx="2" sz="half"/>
+            <p:ph sz="half" idx="2"/>
           </p:nvPr>
         </p:nvSpPr>
         <p:spPr>
@@ -1586,7 +1586,7 @@
             <a:spLocks noGrp="1"/>
           </p:cNvSpPr>
           <p:nvPr>
-            <p:ph idx="3" sz="quarter" type="body"/>
+            <p:ph type="body" sz="quarter" idx="3"/>
           </p:nvPr>
         </p:nvSpPr>
         <p:spPr>
@@ -1598,41 +1598,41 @@
         <p:txBody>
           <a:bodyPr anchor="b"/>
           <a:lstStyle>
-            <a:lvl1pPr indent="0" marL="0">
-              <a:buNone/>
-              <a:defRPr b="1" sz="2400"/>
+            <a:lvl1pPr marL="0" indent="0">
+              <a:buNone/>
+              <a:defRPr sz="2400" b="1"/>
             </a:lvl1pPr>
-            <a:lvl2pPr indent="0" marL="457200">
-              <a:buNone/>
-              <a:defRPr b="1" sz="2000"/>
+            <a:lvl2pPr marL="457200" indent="0">
+              <a:buNone/>
+              <a:defRPr sz="2000" b="1"/>
             </a:lvl2pPr>
-            <a:lvl3pPr indent="0" marL="914400">
-              <a:buNone/>
-              <a:defRPr b="1" sz="1800"/>
+            <a:lvl3pPr marL="914400" indent="0">
+              <a:buNone/>
+              <a:defRPr sz="1800" b="1"/>
             </a:lvl3pPr>
-            <a:lvl4pPr indent="0" marL="1371600">
-              <a:buNone/>
-              <a:defRPr b="1" sz="1600"/>
+            <a:lvl4pPr marL="1371600" indent="0">
+              <a:buNone/>
+              <a:defRPr sz="1600" b="1"/>
             </a:lvl4pPr>
-            <a:lvl5pPr indent="0" marL="1828800">
-              <a:buNone/>
-              <a:defRPr b="1" sz="1600"/>
+            <a:lvl5pPr marL="1828800" indent="0">
+              <a:buNone/>
+              <a:defRPr sz="1600" b="1"/>
             </a:lvl5pPr>
-            <a:lvl6pPr indent="0" marL="2286000">
-              <a:buNone/>
-              <a:defRPr b="1" sz="1600"/>
+            <a:lvl6pPr marL="2286000" indent="0">
+              <a:buNone/>
+              <a:defRPr sz="1600" b="1"/>
             </a:lvl6pPr>
-            <a:lvl7pPr indent="0" marL="2743200">
-              <a:buNone/>
-              <a:defRPr b="1" sz="1600"/>
+            <a:lvl7pPr marL="2743200" indent="0">
+              <a:buNone/>
+              <a:defRPr sz="1600" b="1"/>
             </a:lvl7pPr>
-            <a:lvl8pPr indent="0" marL="3200400">
-              <a:buNone/>
-              <a:defRPr b="1" sz="1600"/>
+            <a:lvl8pPr marL="3200400" indent="0">
+              <a:buNone/>
+              <a:defRPr sz="1600" b="1"/>
             </a:lvl8pPr>
-            <a:lvl9pPr indent="0" marL="3657600">
-              <a:buNone/>
-              <a:defRPr b="1" sz="1600"/>
+            <a:lvl9pPr marL="3657600" indent="0">
+              <a:buNone/>
+              <a:defRPr sz="1600" b="1"/>
             </a:lvl9pPr>
           </a:lstStyle>
           <a:p>
@@ -1651,7 +1651,7 @@
             <a:spLocks noGrp="1"/>
           </p:cNvSpPr>
           <p:nvPr>
-            <p:ph idx="4" sz="quarter"/>
+            <p:ph sz="quarter" idx="4"/>
           </p:nvPr>
         </p:nvSpPr>
         <p:spPr>
@@ -1736,7 +1736,7 @@
             <a:spLocks noGrp="1"/>
           </p:cNvSpPr>
           <p:nvPr>
-            <p:ph idx="10" sz="half" type="dt"/>
+            <p:ph type="dt" sz="half" idx="10"/>
           </p:nvPr>
         </p:nvSpPr>
         <p:spPr/>
@@ -1760,7 +1760,7 @@
             <a:spLocks noGrp="1"/>
           </p:cNvSpPr>
           <p:nvPr>
-            <p:ph idx="11" sz="quarter" type="ftr"/>
+            <p:ph type="ftr" sz="quarter" idx="11"/>
           </p:nvPr>
         </p:nvSpPr>
         <p:spPr/>
@@ -1779,7 +1779,7 @@
             <a:spLocks noGrp="1"/>
           </p:cNvSpPr>
           <p:nvPr>
-            <p:ph idx="12" sz="quarter" type="sldNum"/>
+            <p:ph type="sldNum" sz="quarter" idx="12"/>
           </p:nvPr>
         </p:nvSpPr>
         <p:spPr/>
@@ -1805,7 +1805,7 @@
 </file>
 
 <file path=ppt/slideLayouts/slideLayout6.xml><?xml version="1.0" encoding="utf-8"?>
-<p:sldLayout xmlns:a="http://schemas.openxmlformats.org/drawingml/2006/main" xmlns:p="http://schemas.openxmlformats.org/presentationml/2006/main" xmlns:r="http://schemas.openxmlformats.org/officeDocument/2006/relationships" preserve="1" type="titleOnly">
+<p:sldLayout xmlns:a="http://schemas.openxmlformats.org/drawingml/2006/main" xmlns:r="http://schemas.openxmlformats.org/officeDocument/2006/relationships" xmlns:p="http://schemas.openxmlformats.org/presentationml/2006/main" type="titleOnly" preserve="1">
   <p:cSld name="Title Only">
     <p:spTree>
       <p:nvGrpSpPr>
@@ -1851,7 +1851,7 @@
             <a:spLocks noGrp="1"/>
           </p:cNvSpPr>
           <p:nvPr>
-            <p:ph idx="10" sz="half" type="dt"/>
+            <p:ph type="dt" sz="half" idx="10"/>
           </p:nvPr>
         </p:nvSpPr>
         <p:spPr/>
@@ -1875,7 +1875,7 @@
             <a:spLocks noGrp="1"/>
           </p:cNvSpPr>
           <p:nvPr>
-            <p:ph idx="11" sz="quarter" type="ftr"/>
+            <p:ph type="ftr" sz="quarter" idx="11"/>
           </p:nvPr>
         </p:nvSpPr>
         <p:spPr/>
@@ -1894,7 +1894,7 @@
             <a:spLocks noGrp="1"/>
           </p:cNvSpPr>
           <p:nvPr>
-            <p:ph idx="12" sz="quarter" type="sldNum"/>
+            <p:ph type="sldNum" sz="quarter" idx="12"/>
           </p:nvPr>
         </p:nvSpPr>
         <p:spPr/>
@@ -1920,7 +1920,7 @@
 </file>
 
 <file path=ppt/slideLayouts/slideLayout7.xml><?xml version="1.0" encoding="utf-8"?>
-<p:sldLayout xmlns:a="http://schemas.openxmlformats.org/drawingml/2006/main" xmlns:p="http://schemas.openxmlformats.org/presentationml/2006/main" xmlns:r="http://schemas.openxmlformats.org/officeDocument/2006/relationships" preserve="1" type="blank">
+<p:sldLayout xmlns:a="http://schemas.openxmlformats.org/drawingml/2006/main" xmlns:r="http://schemas.openxmlformats.org/officeDocument/2006/relationships" xmlns:p="http://schemas.openxmlformats.org/presentationml/2006/main" type="blank" preserve="1">
   <p:cSld name="Blank">
     <p:spTree>
       <p:nvGrpSpPr>
@@ -1943,7 +1943,7 @@
             <a:spLocks noGrp="1"/>
           </p:cNvSpPr>
           <p:nvPr>
-            <p:ph idx="10" sz="half" type="dt"/>
+            <p:ph type="dt" sz="half" idx="10"/>
           </p:nvPr>
         </p:nvSpPr>
         <p:spPr/>
@@ -1967,7 +1967,7 @@
             <a:spLocks noGrp="1"/>
           </p:cNvSpPr>
           <p:nvPr>
-            <p:ph idx="11" sz="quarter" type="ftr"/>
+            <p:ph type="ftr" sz="quarter" idx="11"/>
           </p:nvPr>
         </p:nvSpPr>
         <p:spPr/>
@@ -1986,7 +1986,7 @@
             <a:spLocks noGrp="1"/>
           </p:cNvSpPr>
           <p:nvPr>
-            <p:ph idx="12" sz="quarter" type="sldNum"/>
+            <p:ph type="sldNum" sz="quarter" idx="12"/>
           </p:nvPr>
         </p:nvSpPr>
         <p:spPr/>
@@ -2012,7 +2012,7 @@
 </file>
 
 <file path=ppt/slideLayouts/slideLayout8.xml><?xml version="1.0" encoding="utf-8"?>
-<p:sldLayout xmlns:a="http://schemas.openxmlformats.org/drawingml/2006/main" xmlns:p="http://schemas.openxmlformats.org/presentationml/2006/main" xmlns:r="http://schemas.openxmlformats.org/officeDocument/2006/relationships" preserve="1" type="objTx">
+<p:sldLayout xmlns:a="http://schemas.openxmlformats.org/drawingml/2006/main" xmlns:r="http://schemas.openxmlformats.org/officeDocument/2006/relationships" xmlns:p="http://schemas.openxmlformats.org/presentationml/2006/main" type="objTx" preserve="1">
   <p:cSld name="Content with Caption">
     <p:spTree>
       <p:nvGrpSpPr>
@@ -2048,7 +2048,7 @@
           <a:bodyPr anchor="b"/>
           <a:lstStyle>
             <a:lvl1pPr algn="l">
-              <a:defRPr b="1" sz="2000"/>
+              <a:defRPr sz="2000" b="1"/>
             </a:lvl1pPr>
           </a:lstStyle>
           <a:p>
@@ -2152,7 +2152,7 @@
             <a:spLocks noGrp="1"/>
           </p:cNvSpPr>
           <p:nvPr>
-            <p:ph idx="2" sz="half" type="body"/>
+            <p:ph type="body" sz="half" idx="2"/>
           </p:nvPr>
         </p:nvSpPr>
         <p:spPr>
@@ -2164,39 +2164,39 @@
         <p:txBody>
           <a:bodyPr/>
           <a:lstStyle>
-            <a:lvl1pPr indent="0" marL="0">
+            <a:lvl1pPr marL="0" indent="0">
               <a:buNone/>
               <a:defRPr sz="1400"/>
             </a:lvl1pPr>
-            <a:lvl2pPr indent="0" marL="457200">
+            <a:lvl2pPr marL="457200" indent="0">
               <a:buNone/>
               <a:defRPr sz="1200"/>
             </a:lvl2pPr>
-            <a:lvl3pPr indent="0" marL="914400">
+            <a:lvl3pPr marL="914400" indent="0">
               <a:buNone/>
               <a:defRPr sz="1000"/>
             </a:lvl3pPr>
-            <a:lvl4pPr indent="0" marL="1371600">
+            <a:lvl4pPr marL="1371600" indent="0">
               <a:buNone/>
               <a:defRPr sz="900"/>
             </a:lvl4pPr>
-            <a:lvl5pPr indent="0" marL="1828800">
+            <a:lvl5pPr marL="1828800" indent="0">
               <a:buNone/>
               <a:defRPr sz="900"/>
             </a:lvl5pPr>
-            <a:lvl6pPr indent="0" marL="2286000">
+            <a:lvl6pPr marL="2286000" indent="0">
               <a:buNone/>
               <a:defRPr sz="900"/>
             </a:lvl6pPr>
-            <a:lvl7pPr indent="0" marL="2743200">
+            <a:lvl7pPr marL="2743200" indent="0">
               <a:buNone/>
               <a:defRPr sz="900"/>
             </a:lvl7pPr>
-            <a:lvl8pPr indent="0" marL="3200400">
+            <a:lvl8pPr marL="3200400" indent="0">
               <a:buNone/>
               <a:defRPr sz="900"/>
             </a:lvl8pPr>
-            <a:lvl9pPr indent="0" marL="3657600">
+            <a:lvl9pPr marL="3657600" indent="0">
               <a:buNone/>
               <a:defRPr sz="900"/>
             </a:lvl9pPr>
@@ -2217,7 +2217,7 @@
             <a:spLocks noGrp="1"/>
           </p:cNvSpPr>
           <p:nvPr>
-            <p:ph idx="10" sz="half" type="dt"/>
+            <p:ph type="dt" sz="half" idx="10"/>
           </p:nvPr>
         </p:nvSpPr>
         <p:spPr/>
@@ -2241,7 +2241,7 @@
             <a:spLocks noGrp="1"/>
           </p:cNvSpPr>
           <p:nvPr>
-            <p:ph idx="11" sz="quarter" type="ftr"/>
+            <p:ph type="ftr" sz="quarter" idx="11"/>
           </p:nvPr>
         </p:nvSpPr>
         <p:spPr/>
@@ -2260,7 +2260,7 @@
             <a:spLocks noGrp="1"/>
           </p:cNvSpPr>
           <p:nvPr>
-            <p:ph idx="12" sz="quarter" type="sldNum"/>
+            <p:ph type="sldNum" sz="quarter" idx="12"/>
           </p:nvPr>
         </p:nvSpPr>
         <p:spPr/>
@@ -2286,7 +2286,7 @@
 </file>
 
 <file path=ppt/slideLayouts/slideLayout9.xml><?xml version="1.0" encoding="utf-8"?>
-<p:sldLayout xmlns:a="http://schemas.openxmlformats.org/drawingml/2006/main" xmlns:p="http://schemas.openxmlformats.org/presentationml/2006/main" xmlns:r="http://schemas.openxmlformats.org/officeDocument/2006/relationships" preserve="1" type="picTx">
+<p:sldLayout xmlns:a="http://schemas.openxmlformats.org/drawingml/2006/main" xmlns:r="http://schemas.openxmlformats.org/officeDocument/2006/relationships" xmlns:p="http://schemas.openxmlformats.org/presentationml/2006/main" type="picTx" preserve="1">
   <p:cSld name="Picture with Caption">
     <p:spTree>
       <p:nvGrpSpPr>
@@ -2322,7 +2322,7 @@
           <a:bodyPr anchor="b"/>
           <a:lstStyle>
             <a:lvl1pPr algn="l">
-              <a:defRPr b="1" sz="2000"/>
+              <a:defRPr sz="2000" b="1"/>
             </a:lvl1pPr>
           </a:lstStyle>
           <a:p>
@@ -2341,7 +2341,7 @@
             <a:spLocks noGrp="1"/>
           </p:cNvSpPr>
           <p:nvPr>
-            <p:ph idx="1" type="pic"/>
+            <p:ph type="pic" idx="1"/>
           </p:nvPr>
         </p:nvSpPr>
         <p:spPr>
@@ -2353,39 +2353,39 @@
         <p:txBody>
           <a:bodyPr/>
           <a:lstStyle>
-            <a:lvl1pPr indent="0" marL="0">
+            <a:lvl1pPr marL="0" indent="0">
               <a:buNone/>
               <a:defRPr sz="3200"/>
             </a:lvl1pPr>
-            <a:lvl2pPr indent="0" marL="457200">
+            <a:lvl2pPr marL="457200" indent="0">
               <a:buNone/>
               <a:defRPr sz="2800"/>
             </a:lvl2pPr>
-            <a:lvl3pPr indent="0" marL="914400">
+            <a:lvl3pPr marL="914400" indent="0">
               <a:buNone/>
               <a:defRPr sz="2400"/>
             </a:lvl3pPr>
-            <a:lvl4pPr indent="0" marL="1371600">
+            <a:lvl4pPr marL="1371600" indent="0">
               <a:buNone/>
               <a:defRPr sz="2000"/>
             </a:lvl4pPr>
-            <a:lvl5pPr indent="0" marL="1828800">
+            <a:lvl5pPr marL="1828800" indent="0">
               <a:buNone/>
               <a:defRPr sz="2000"/>
             </a:lvl5pPr>
-            <a:lvl6pPr indent="0" marL="2286000">
+            <a:lvl6pPr marL="2286000" indent="0">
               <a:buNone/>
               <a:defRPr sz="2000"/>
             </a:lvl6pPr>
-            <a:lvl7pPr indent="0" marL="2743200">
+            <a:lvl7pPr marL="2743200" indent="0">
               <a:buNone/>
               <a:defRPr sz="2000"/>
             </a:lvl7pPr>
-            <a:lvl8pPr indent="0" marL="3200400">
+            <a:lvl8pPr marL="3200400" indent="0">
               <a:buNone/>
               <a:defRPr sz="2000"/>
             </a:lvl8pPr>
-            <a:lvl9pPr indent="0" marL="3657600">
+            <a:lvl9pPr marL="3657600" indent="0">
               <a:buNone/>
               <a:defRPr sz="2000"/>
             </a:lvl9pPr>
@@ -2402,7 +2402,7 @@
             <a:spLocks noGrp="1"/>
           </p:cNvSpPr>
           <p:nvPr>
-            <p:ph idx="2" sz="half" type="body"/>
+            <p:ph type="body" sz="half" idx="2"/>
           </p:nvPr>
         </p:nvSpPr>
         <p:spPr>
@@ -2414,39 +2414,39 @@
         <p:txBody>
           <a:bodyPr/>
           <a:lstStyle>
-            <a:lvl1pPr indent="0" marL="0">
+            <a:lvl1pPr marL="0" indent="0">
               <a:buNone/>
               <a:defRPr sz="1400"/>
             </a:lvl1pPr>
-            <a:lvl2pPr indent="0" marL="457200">
+            <a:lvl2pPr marL="457200" indent="0">
               <a:buNone/>
               <a:defRPr sz="1200"/>
             </a:lvl2pPr>
-            <a:lvl3pPr indent="0" marL="914400">
+            <a:lvl3pPr marL="914400" indent="0">
               <a:buNone/>
               <a:defRPr sz="1000"/>
             </a:lvl3pPr>
-            <a:lvl4pPr indent="0" marL="1371600">
+            <a:lvl4pPr marL="1371600" indent="0">
               <a:buNone/>
               <a:defRPr sz="900"/>
             </a:lvl4pPr>
-            <a:lvl5pPr indent="0" marL="1828800">
+            <a:lvl5pPr marL="1828800" indent="0">
               <a:buNone/>
               <a:defRPr sz="900"/>
             </a:lvl5pPr>
-            <a:lvl6pPr indent="0" marL="2286000">
+            <a:lvl6pPr marL="2286000" indent="0">
               <a:buNone/>
               <a:defRPr sz="900"/>
             </a:lvl6pPr>
-            <a:lvl7pPr indent="0" marL="2743200">
+            <a:lvl7pPr marL="2743200" indent="0">
               <a:buNone/>
               <a:defRPr sz="900"/>
             </a:lvl7pPr>
-            <a:lvl8pPr indent="0" marL="3200400">
+            <a:lvl8pPr marL="3200400" indent="0">
               <a:buNone/>
               <a:defRPr sz="900"/>
             </a:lvl8pPr>
-            <a:lvl9pPr indent="0" marL="3657600">
+            <a:lvl9pPr marL="3657600" indent="0">
               <a:buNone/>
               <a:defRPr sz="900"/>
             </a:lvl9pPr>
@@ -2467,7 +2467,7 @@
             <a:spLocks noGrp="1"/>
           </p:cNvSpPr>
           <p:nvPr>
-            <p:ph idx="10" sz="half" type="dt"/>
+            <p:ph type="dt" sz="half" idx="10"/>
           </p:nvPr>
         </p:nvSpPr>
         <p:spPr/>
@@ -2491,7 +2491,7 @@
             <a:spLocks noGrp="1"/>
           </p:cNvSpPr>
           <p:nvPr>
-            <p:ph idx="11" sz="quarter" type="ftr"/>
+            <p:ph type="ftr" sz="quarter" idx="11"/>
           </p:nvPr>
         </p:nvSpPr>
         <p:spPr/>
@@ -2510,7 +2510,7 @@
             <a:spLocks noGrp="1"/>
           </p:cNvSpPr>
           <p:nvPr>
-            <p:ph idx="12" sz="quarter" type="sldNum"/>
+            <p:ph type="sldNum" sz="quarter" idx="12"/>
           </p:nvPr>
         </p:nvSpPr>
         <p:spPr/>
@@ -2536,7 +2536,7 @@
 </file>
 
 <file path=ppt/slideMasters/slideMaster1.xml><?xml version="1.0" encoding="utf-8"?>
-<p:sldMaster xmlns:a="http://schemas.openxmlformats.org/drawingml/2006/main" xmlns:p="http://schemas.openxmlformats.org/presentationml/2006/main" xmlns:r="http://schemas.openxmlformats.org/officeDocument/2006/relationships">
+<p:sldMaster xmlns:a="http://schemas.openxmlformats.org/drawingml/2006/main" xmlns:r="http://schemas.openxmlformats.org/officeDocument/2006/relationships" xmlns:p="http://schemas.openxmlformats.org/presentationml/2006/main">
   <p:cSld>
     <p:bg>
       <p:bgRef idx="1001">
@@ -2577,7 +2577,7 @@
           </a:prstGeom>
         </p:spPr>
         <p:txBody>
-          <a:bodyPr anchor="ctr" bIns="45720" lIns="91440" rIns="91440" rtlCol="0" tIns="45720" vert="horz">
+          <a:bodyPr vert="horz" lIns="91440" tIns="45720" rIns="91440" bIns="45720" rtlCol="0" anchor="ctr">
             <a:normAutofit/>
           </a:bodyPr>
           <a:lstStyle/>
@@ -2597,7 +2597,7 @@
             <a:spLocks noGrp="1"/>
           </p:cNvSpPr>
           <p:nvPr>
-            <p:ph idx="1" type="body"/>
+            <p:ph type="body" idx="1"/>
           </p:nvPr>
         </p:nvSpPr>
         <p:spPr>
@@ -2610,7 +2610,7 @@
           </a:prstGeom>
         </p:spPr>
         <p:txBody>
-          <a:bodyPr bIns="45720" lIns="91440" rIns="91440" rtlCol="0" tIns="45720" vert="horz">
+          <a:bodyPr vert="horz" lIns="91440" tIns="45720" rIns="91440" bIns="45720" rtlCol="0">
             <a:normAutofit/>
           </a:bodyPr>
           <a:lstStyle/>
@@ -2659,7 +2659,7 @@
             <a:spLocks noGrp="1"/>
           </p:cNvSpPr>
           <p:nvPr>
-            <p:ph idx="2" sz="half" type="dt"/>
+            <p:ph type="dt" sz="half" idx="2"/>
           </p:nvPr>
         </p:nvSpPr>
         <p:spPr>
@@ -2672,7 +2672,7 @@
           </a:prstGeom>
         </p:spPr>
         <p:txBody>
-          <a:bodyPr anchor="ctr" bIns="45720" lIns="91440" rIns="91440" rtlCol="0" tIns="45720" vert="horz"/>
+          <a:bodyPr vert="horz" lIns="91440" tIns="45720" rIns="91440" bIns="45720" rtlCol="0" anchor="ctr"/>
           <a:lstStyle>
             <a:lvl1pPr algn="l">
               <a:defRPr sz="1200">
@@ -2701,7 +2701,7 @@
             <a:spLocks noGrp="1"/>
           </p:cNvSpPr>
           <p:nvPr>
-            <p:ph idx="3" sz="quarter" type="ftr"/>
+            <p:ph type="ftr" sz="quarter" idx="3"/>
           </p:nvPr>
         </p:nvSpPr>
         <p:spPr>
@@ -2714,7 +2714,7 @@
           </a:prstGeom>
         </p:spPr>
         <p:txBody>
-          <a:bodyPr anchor="ctr" bIns="45720" lIns="91440" rIns="91440" rtlCol="0" tIns="45720" vert="horz"/>
+          <a:bodyPr vert="horz" lIns="91440" tIns="45720" rIns="91440" bIns="45720" rtlCol="0" anchor="ctr"/>
           <a:lstStyle>
             <a:lvl1pPr algn="ctr">
               <a:defRPr sz="1200">
@@ -2738,7 +2738,7 @@
             <a:spLocks noGrp="1"/>
           </p:cNvSpPr>
           <p:nvPr>
-            <p:ph idx="4" sz="quarter" type="sldNum"/>
+            <p:ph type="sldNum" sz="quarter" idx="4"/>
           </p:nvPr>
         </p:nvSpPr>
         <p:spPr>
@@ -2751,7 +2751,7 @@
           </a:prstGeom>
         </p:spPr>
         <p:txBody>
-          <a:bodyPr anchor="ctr" bIns="45720" lIns="91440" rIns="91440" rtlCol="0" tIns="45720" vert="horz"/>
+          <a:bodyPr vert="horz" lIns="91440" tIns="45720" rIns="91440" bIns="45720" rtlCol="0" anchor="ctr"/>
           <a:lstStyle>
             <a:lvl1pPr algn="r">
               <a:defRPr sz="1200">
@@ -2775,7 +2775,7 @@
       </p:sp>
     </p:spTree>
   </p:cSld>
-  <p:clrMap accent1="accent1" accent2="accent2" accent3="accent3" accent4="accent4" accent5="accent5" accent6="accent6" bg1="lt1" bg2="lt2" folHlink="folHlink" hlink="hlink" tx1="dk1" tx2="dk2"/>
+  <p:clrMap bg1="lt1" tx1="dk1" bg2="lt2" tx2="dk2" accent1="accent1" accent2="accent2" accent3="accent3" accent4="accent4" accent5="accent5" accent6="accent6" hlink="hlink" folHlink="folHlink"/>
   <p:sldLayoutIdLst>
     <p:sldLayoutId id="2147483649" r:id="rId1"/>
     <p:sldLayoutId id="2147483650" r:id="rId2"/>
@@ -2791,12 +2791,12 @@
   </p:sldLayoutIdLst>
   <p:txStyles>
     <p:titleStyle>
-      <a:lvl1pPr algn="ctr" defTabSz="914400" eaLnBrk="1" hangingPunct="1" latinLnBrk="0" rtl="0">
+      <a:lvl1pPr algn="ctr" defTabSz="914400" rtl="0" eaLnBrk="1" latinLnBrk="0" hangingPunct="1">
         <a:spcBef>
           <a:spcPct val="0"/>
         </a:spcBef>
         <a:buNone/>
-        <a:defRPr kern="1200" sz="4400">
+        <a:defRPr sz="4400" kern="1200">
           <a:solidFill>
             <a:schemeClr val="tx1"/>
           </a:solidFill>
@@ -2807,13 +2807,13 @@
       </a:lvl1pPr>
     </p:titleStyle>
     <p:bodyStyle>
-      <a:lvl1pPr algn="l" defTabSz="914400" eaLnBrk="1" hangingPunct="1" indent="-342900" latinLnBrk="0" marL="342900" rtl="0">
+      <a:lvl1pPr marL="342900" indent="-342900" algn="l" defTabSz="914400" rtl="0" eaLnBrk="1" latinLnBrk="0" hangingPunct="1">
         <a:spcBef>
           <a:spcPct val="20000"/>
         </a:spcBef>
-        <a:buFont charset="0" pitchFamily="34" typeface="Arial"/>
+        <a:buFont typeface="Arial" pitchFamily="34" charset="0"/>
         <a:buChar char="•"/>
-        <a:defRPr kern="1200" sz="3200">
+        <a:defRPr sz="3200" kern="1200">
           <a:solidFill>
             <a:schemeClr val="tx1"/>
           </a:solidFill>
@@ -2822,13 +2822,13 @@
           <a:cs typeface="+mn-cs"/>
         </a:defRPr>
       </a:lvl1pPr>
-      <a:lvl2pPr algn="l" defTabSz="914400" eaLnBrk="1" hangingPunct="1" indent="-285750" latinLnBrk="0" marL="742950" rtl="0">
+      <a:lvl2pPr marL="742950" indent="-285750" algn="l" defTabSz="914400" rtl="0" eaLnBrk="1" latinLnBrk="0" hangingPunct="1">
         <a:spcBef>
           <a:spcPct val="20000"/>
         </a:spcBef>
-        <a:buFont charset="0" pitchFamily="34" typeface="Arial"/>
+        <a:buFont typeface="Arial" pitchFamily="34" charset="0"/>
         <a:buChar char="–"/>
-        <a:defRPr kern="1200" sz="2800">
+        <a:defRPr sz="2800" kern="1200">
           <a:solidFill>
             <a:schemeClr val="tx1"/>
           </a:solidFill>
@@ -2837,13 +2837,13 @@
           <a:cs typeface="+mn-cs"/>
         </a:defRPr>
       </a:lvl2pPr>
-      <a:lvl3pPr algn="l" defTabSz="914400" eaLnBrk="1" hangingPunct="1" indent="-228600" latinLnBrk="0" marL="1143000" rtl="0">
+      <a:lvl3pPr marL="1143000" indent="-228600" algn="l" defTabSz="914400" rtl="0" eaLnBrk="1" latinLnBrk="0" hangingPunct="1">
         <a:spcBef>
           <a:spcPct val="20000"/>
         </a:spcBef>
-        <a:buFont charset="0" pitchFamily="34" typeface="Arial"/>
+        <a:buFont typeface="Arial" pitchFamily="34" charset="0"/>
         <a:buChar char="•"/>
-        <a:defRPr kern="1200" sz="2400">
+        <a:defRPr sz="2400" kern="1200">
           <a:solidFill>
             <a:schemeClr val="tx1"/>
           </a:solidFill>
@@ -2852,13 +2852,13 @@
           <a:cs typeface="+mn-cs"/>
         </a:defRPr>
       </a:lvl3pPr>
-      <a:lvl4pPr algn="l" defTabSz="914400" eaLnBrk="1" hangingPunct="1" indent="-228600" latinLnBrk="0" marL="1600200" rtl="0">
+      <a:lvl4pPr marL="1600200" indent="-228600" algn="l" defTabSz="914400" rtl="0" eaLnBrk="1" latinLnBrk="0" hangingPunct="1">
         <a:spcBef>
           <a:spcPct val="20000"/>
         </a:spcBef>
-        <a:buFont charset="0" pitchFamily="34" typeface="Arial"/>
+        <a:buFont typeface="Arial" pitchFamily="34" charset="0"/>
         <a:buChar char="–"/>
-        <a:defRPr kern="1200" sz="2000">
+        <a:defRPr sz="2000" kern="1200">
           <a:solidFill>
             <a:schemeClr val="tx1"/>
           </a:solidFill>
@@ -2867,13 +2867,13 @@
           <a:cs typeface="+mn-cs"/>
         </a:defRPr>
       </a:lvl4pPr>
-      <a:lvl5pPr algn="l" defTabSz="914400" eaLnBrk="1" hangingPunct="1" indent="-228600" latinLnBrk="0" marL="2057400" rtl="0">
+      <a:lvl5pPr marL="2057400" indent="-228600" algn="l" defTabSz="914400" rtl="0" eaLnBrk="1" latinLnBrk="0" hangingPunct="1">
         <a:spcBef>
           <a:spcPct val="20000"/>
         </a:spcBef>
-        <a:buFont charset="0" pitchFamily="34" typeface="Arial"/>
+        <a:buFont typeface="Arial" pitchFamily="34" charset="0"/>
         <a:buChar char="»"/>
-        <a:defRPr kern="1200" sz="2000">
+        <a:defRPr sz="2000" kern="1200">
           <a:solidFill>
             <a:schemeClr val="tx1"/>
           </a:solidFill>
@@ -2882,13 +2882,13 @@
           <a:cs typeface="+mn-cs"/>
         </a:defRPr>
       </a:lvl5pPr>
-      <a:lvl6pPr algn="l" defTabSz="914400" eaLnBrk="1" hangingPunct="1" indent="-228600" latinLnBrk="0" marL="2514600" rtl="0">
+      <a:lvl6pPr marL="2514600" indent="-228600" algn="l" defTabSz="914400" rtl="0" eaLnBrk="1" latinLnBrk="0" hangingPunct="1">
         <a:spcBef>
           <a:spcPct val="20000"/>
         </a:spcBef>
-        <a:buFont charset="0" pitchFamily="34" typeface="Arial"/>
+        <a:buFont typeface="Arial" pitchFamily="34" charset="0"/>
         <a:buChar char="•"/>
-        <a:defRPr kern="1200" sz="2000">
+        <a:defRPr sz="2000" kern="1200">
           <a:solidFill>
             <a:schemeClr val="tx1"/>
           </a:solidFill>
@@ -2897,13 +2897,13 @@
           <a:cs typeface="+mn-cs"/>
         </a:defRPr>
       </a:lvl6pPr>
-      <a:lvl7pPr algn="l" defTabSz="914400" eaLnBrk="1" hangingPunct="1" indent="-228600" latinLnBrk="0" marL="2971800" rtl="0">
+      <a:lvl7pPr marL="2971800" indent="-228600" algn="l" defTabSz="914400" rtl="0" eaLnBrk="1" latinLnBrk="0" hangingPunct="1">
         <a:spcBef>
           <a:spcPct val="20000"/>
         </a:spcBef>
-        <a:buFont charset="0" pitchFamily="34" typeface="Arial"/>
+        <a:buFont typeface="Arial" pitchFamily="34" charset="0"/>
         <a:buChar char="•"/>
-        <a:defRPr kern="1200" sz="2000">
+        <a:defRPr sz="2000" kern="1200">
           <a:solidFill>
             <a:schemeClr val="tx1"/>
           </a:solidFill>
@@ -2912,13 +2912,13 @@
           <a:cs typeface="+mn-cs"/>
         </a:defRPr>
       </a:lvl7pPr>
-      <a:lvl8pPr algn="l" defTabSz="914400" eaLnBrk="1" hangingPunct="1" indent="-228600" latinLnBrk="0" marL="3429000" rtl="0">
+      <a:lvl8pPr marL="3429000" indent="-228600" algn="l" defTabSz="914400" rtl="0" eaLnBrk="1" latinLnBrk="0" hangingPunct="1">
         <a:spcBef>
           <a:spcPct val="20000"/>
         </a:spcBef>
-        <a:buFont charset="0" pitchFamily="34" typeface="Arial"/>
+        <a:buFont typeface="Arial" pitchFamily="34" charset="0"/>
         <a:buChar char="•"/>
-        <a:defRPr kern="1200" sz="2000">
+        <a:defRPr sz="2000" kern="1200">
           <a:solidFill>
             <a:schemeClr val="tx1"/>
           </a:solidFill>
@@ -2927,13 +2927,13 @@
           <a:cs typeface="+mn-cs"/>
         </a:defRPr>
       </a:lvl8pPr>
-      <a:lvl9pPr algn="l" defTabSz="914400" eaLnBrk="1" hangingPunct="1" indent="-228600" latinLnBrk="0" marL="3886200" rtl="0">
+      <a:lvl9pPr marL="3886200" indent="-228600" algn="l" defTabSz="914400" rtl="0" eaLnBrk="1" latinLnBrk="0" hangingPunct="1">
         <a:spcBef>
           <a:spcPct val="20000"/>
         </a:spcBef>
-        <a:buFont charset="0" pitchFamily="34" typeface="Arial"/>
+        <a:buFont typeface="Arial" pitchFamily="34" charset="0"/>
         <a:buChar char="•"/>
-        <a:defRPr kern="1200" sz="2000">
+        <a:defRPr sz="2000" kern="1200">
           <a:solidFill>
             <a:schemeClr val="tx1"/>
           </a:solidFill>
@@ -2947,8 +2947,8 @@
       <a:defPPr>
         <a:defRPr lang="en-US"/>
       </a:defPPr>
-      <a:lvl1pPr algn="l" defTabSz="914400" eaLnBrk="1" hangingPunct="1" latinLnBrk="0" marL="0" rtl="0">
-        <a:defRPr kern="1200" sz="1800">
+      <a:lvl1pPr marL="0" algn="l" defTabSz="914400" rtl="0" eaLnBrk="1" latinLnBrk="0" hangingPunct="1">
+        <a:defRPr sz="1800" kern="1200">
           <a:solidFill>
             <a:schemeClr val="tx1"/>
           </a:solidFill>
@@ -2957,8 +2957,8 @@
           <a:cs typeface="+mn-cs"/>
         </a:defRPr>
       </a:lvl1pPr>
-      <a:lvl2pPr algn="l" defTabSz="914400" eaLnBrk="1" hangingPunct="1" latinLnBrk="0" marL="457200" rtl="0">
-        <a:defRPr kern="1200" sz="1800">
+      <a:lvl2pPr marL="457200" algn="l" defTabSz="914400" rtl="0" eaLnBrk="1" latinLnBrk="0" hangingPunct="1">
+        <a:defRPr sz="1800" kern="1200">
           <a:solidFill>
             <a:schemeClr val="tx1"/>
           </a:solidFill>
@@ -2967,8 +2967,8 @@
           <a:cs typeface="+mn-cs"/>
         </a:defRPr>
       </a:lvl2pPr>
-      <a:lvl3pPr algn="l" defTabSz="914400" eaLnBrk="1" hangingPunct="1" latinLnBrk="0" marL="914400" rtl="0">
-        <a:defRPr kern="1200" sz="1800">
+      <a:lvl3pPr marL="914400" algn="l" defTabSz="914400" rtl="0" eaLnBrk="1" latinLnBrk="0" hangingPunct="1">
+        <a:defRPr sz="1800" kern="1200">
           <a:solidFill>
             <a:schemeClr val="tx1"/>
           </a:solidFill>
@@ -2977,8 +2977,8 @@
           <a:cs typeface="+mn-cs"/>
         </a:defRPr>
       </a:lvl3pPr>
-      <a:lvl4pPr algn="l" defTabSz="914400" eaLnBrk="1" hangingPunct="1" latinLnBrk="0" marL="1371600" rtl="0">
-        <a:defRPr kern="1200" sz="1800">
+      <a:lvl4pPr marL="1371600" algn="l" defTabSz="914400" rtl="0" eaLnBrk="1" latinLnBrk="0" hangingPunct="1">
+        <a:defRPr sz="1800" kern="1200">
           <a:solidFill>
             <a:schemeClr val="tx1"/>
           </a:solidFill>
@@ -2987,8 +2987,8 @@
           <a:cs typeface="+mn-cs"/>
         </a:defRPr>
       </a:lvl4pPr>
-      <a:lvl5pPr algn="l" defTabSz="914400" eaLnBrk="1" hangingPunct="1" latinLnBrk="0" marL="1828800" rtl="0">
-        <a:defRPr kern="1200" sz="1800">
+      <a:lvl5pPr marL="1828800" algn="l" defTabSz="914400" rtl="0" eaLnBrk="1" latinLnBrk="0" hangingPunct="1">
+        <a:defRPr sz="1800" kern="1200">
           <a:solidFill>
             <a:schemeClr val="tx1"/>
           </a:solidFill>
@@ -2997,8 +2997,8 @@
           <a:cs typeface="+mn-cs"/>
         </a:defRPr>
       </a:lvl5pPr>
-      <a:lvl6pPr algn="l" defTabSz="914400" eaLnBrk="1" hangingPunct="1" latinLnBrk="0" marL="2286000" rtl="0">
-        <a:defRPr kern="1200" sz="1800">
+      <a:lvl6pPr marL="2286000" algn="l" defTabSz="914400" rtl="0" eaLnBrk="1" latinLnBrk="0" hangingPunct="1">
+        <a:defRPr sz="1800" kern="1200">
           <a:solidFill>
             <a:schemeClr val="tx1"/>
           </a:solidFill>
@@ -3007,8 +3007,8 @@
           <a:cs typeface="+mn-cs"/>
         </a:defRPr>
       </a:lvl6pPr>
-      <a:lvl7pPr algn="l" defTabSz="914400" eaLnBrk="1" hangingPunct="1" latinLnBrk="0" marL="2743200" rtl="0">
-        <a:defRPr kern="1200" sz="1800">
+      <a:lvl7pPr marL="2743200" algn="l" defTabSz="914400" rtl="0" eaLnBrk="1" latinLnBrk="0" hangingPunct="1">
+        <a:defRPr sz="1800" kern="1200">
           <a:solidFill>
             <a:schemeClr val="tx1"/>
           </a:solidFill>
@@ -3017,8 +3017,8 @@
           <a:cs typeface="+mn-cs"/>
         </a:defRPr>
       </a:lvl7pPr>
-      <a:lvl8pPr algn="l" defTabSz="914400" eaLnBrk="1" hangingPunct="1" latinLnBrk="0" marL="3200400" rtl="0">
-        <a:defRPr kern="1200" sz="1800">
+      <a:lvl8pPr marL="3200400" algn="l" defTabSz="914400" rtl="0" eaLnBrk="1" latinLnBrk="0" hangingPunct="1">
+        <a:defRPr sz="1800" kern="1200">
           <a:solidFill>
             <a:schemeClr val="tx1"/>
           </a:solidFill>
@@ -3027,8 +3027,8 @@
           <a:cs typeface="+mn-cs"/>
         </a:defRPr>
       </a:lvl8pPr>
-      <a:lvl9pPr algn="l" defTabSz="914400" eaLnBrk="1" hangingPunct="1" latinLnBrk="0" marL="3657600" rtl="0">
-        <a:defRPr kern="1200" sz="1800">
+      <a:lvl9pPr marL="3657600" algn="l" defTabSz="914400" rtl="0" eaLnBrk="1" latinLnBrk="0" hangingPunct="1">
+        <a:defRPr sz="1800" kern="1200">
           <a:solidFill>
             <a:schemeClr val="tx1"/>
           </a:solidFill>
@@ -3133,10 +3133,10 @@
   <a:themeElements>
     <a:clrScheme name="Office">
       <a:dk1>
-        <a:sysClr lastClr="000000" val="windowText"/>
+        <a:sysClr val="windowText" lastClr="000000"/>
       </a:dk1>
       <a:lt1>
-        <a:sysClr lastClr="FFFFFF" val="window"/>
+        <a:sysClr val="window" lastClr="FFFFFF"/>
       </a:lt1>
       <a:dk2>
         <a:srgbClr val="1F497D"/>
@@ -3292,7 +3292,7 @@
         </a:gradFill>
       </a:fillStyleLst>
       <a:lnStyleLst>
-        <a:ln algn="ctr" cap="flat" cmpd="sng" w="9525">
+        <a:ln w="9525" cap="flat" cmpd="sng" algn="ctr">
           <a:solidFill>
             <a:schemeClr val="phClr">
               <a:shade val="95000"/>
@@ -3301,13 +3301,13 @@
           </a:solidFill>
           <a:prstDash val="solid"/>
         </a:ln>
-        <a:ln algn="ctr" cap="flat" cmpd="sng" w="25400">
+        <a:ln w="25400" cap="flat" cmpd="sng" algn="ctr">
           <a:solidFill>
             <a:schemeClr val="phClr"/>
           </a:solidFill>
           <a:prstDash val="solid"/>
         </a:ln>
-        <a:ln algn="ctr" cap="flat" cmpd="sng" w="38100">
+        <a:ln w="38100" cap="flat" cmpd="sng" algn="ctr">
           <a:solidFill>
             <a:schemeClr val="phClr"/>
           </a:solidFill>
@@ -3317,7 +3317,7 @@
       <a:effectStyleLst>
         <a:effectStyle>
           <a:effectLst>
-            <a:outerShdw blurRad="40000" dir="5400000" dist="20000" rotWithShape="0">
+            <a:outerShdw blurRad="40000" dist="20000" dir="5400000" rotWithShape="0">
               <a:srgbClr val="000000">
                 <a:alpha val="38000"/>
               </a:srgbClr>
@@ -3326,7 +3326,7 @@
         </a:effectStyle>
         <a:effectStyle>
           <a:effectLst>
-            <a:outerShdw blurRad="40000" dir="5400000" dist="23000" rotWithShape="0">
+            <a:outerShdw blurRad="40000" dist="23000" dir="5400000" rotWithShape="0">
               <a:srgbClr val="000000">
                 <a:alpha val="35000"/>
               </a:srgbClr>
@@ -3335,7 +3335,7 @@
         </a:effectStyle>
         <a:effectStyle>
           <a:effectLst>
-            <a:outerShdw blurRad="40000" dir="5400000" dist="23000" rotWithShape="0">
+            <a:outerShdw blurRad="40000" dist="23000" dir="5400000" rotWithShape="0">
               <a:srgbClr val="000000">
                 <a:alpha val="35000"/>
               </a:srgbClr>
@@ -3345,12 +3345,12 @@
             <a:camera prst="orthographicFront">
               <a:rot lat="0" lon="0" rev="0"/>
             </a:camera>
-            <a:lightRig dir="t" rig="threePt">
+            <a:lightRig rig="threePt" dir="t">
               <a:rot lat="0" lon="0" rev="1200000"/>
             </a:lightRig>
           </a:scene3d>
           <a:sp3d>
-            <a:bevelT h="25400" w="63500"/>
+            <a:bevelT w="63500" h="25400"/>
           </a:sp3d>
         </a:effectStyle>
       </a:effectStyleLst>
@@ -3381,7 +3381,7 @@
             </a:gs>
           </a:gsLst>
           <a:path path="circle">
-            <a:fillToRect b="180000" l="50000" r="50000" t="-80000"/>
+            <a:fillToRect l="50000" t="-80000" r="50000" b="180000"/>
           </a:path>
         </a:gradFill>
         <a:gradFill rotWithShape="1">
@@ -3400,7 +3400,7 @@
             </a:gs>
           </a:gsLst>
           <a:path path="circle">
-            <a:fillToRect b="50000" l="50000" r="50000" t="50000"/>
+            <a:fillToRect l="50000" t="50000" r="50000" b="50000"/>
           </a:path>
         </a:gradFill>
       </a:bgFillStyleLst>

</xml_diff>